<commit_message>
Deployed cb40e4d with MkDocs version: 1.1.2
</commit_message>
<xml_diff>
--- a/img/figures.pptx
+++ b/img/figures.pptx
@@ -13,6 +13,7 @@
     <p:sldId id="260" r:id="rId7"/>
     <p:sldId id="261" r:id="rId8"/>
     <p:sldId id="263" r:id="rId9"/>
+    <p:sldId id="264" r:id="rId10"/>
   </p:sldIdLst>
   <p:sldSz cx="12192000" cy="6858000"/>
   <p:notesSz cx="6858000" cy="9144000"/>
@@ -266,7 +267,7 @@
           <a:p>
             <a:fld id="{FD3A94D9-38B3-6A4F-AECD-4D297511D178}" type="datetimeFigureOut">
               <a:rPr lang="en-US" smtClean="0"/>
-              <a:t>3/12/21</a:t>
+              <a:t>11/26/21</a:t>
             </a:fld>
             <a:endParaRPr lang="en-US"/>
           </a:p>
@@ -464,7 +465,7 @@
           <a:p>
             <a:fld id="{FD3A94D9-38B3-6A4F-AECD-4D297511D178}" type="datetimeFigureOut">
               <a:rPr lang="en-US" smtClean="0"/>
-              <a:t>3/12/21</a:t>
+              <a:t>11/26/21</a:t>
             </a:fld>
             <a:endParaRPr lang="en-US"/>
           </a:p>
@@ -672,7 +673,7 @@
           <a:p>
             <a:fld id="{FD3A94D9-38B3-6A4F-AECD-4D297511D178}" type="datetimeFigureOut">
               <a:rPr lang="en-US" smtClean="0"/>
-              <a:t>3/12/21</a:t>
+              <a:t>11/26/21</a:t>
             </a:fld>
             <a:endParaRPr lang="en-US"/>
           </a:p>
@@ -870,7 +871,7 @@
           <a:p>
             <a:fld id="{FD3A94D9-38B3-6A4F-AECD-4D297511D178}" type="datetimeFigureOut">
               <a:rPr lang="en-US" smtClean="0"/>
-              <a:t>3/12/21</a:t>
+              <a:t>11/26/21</a:t>
             </a:fld>
             <a:endParaRPr lang="en-US"/>
           </a:p>
@@ -1145,7 +1146,7 @@
           <a:p>
             <a:fld id="{FD3A94D9-38B3-6A4F-AECD-4D297511D178}" type="datetimeFigureOut">
               <a:rPr lang="en-US" smtClean="0"/>
-              <a:t>3/12/21</a:t>
+              <a:t>11/26/21</a:t>
             </a:fld>
             <a:endParaRPr lang="en-US"/>
           </a:p>
@@ -1410,7 +1411,7 @@
           <a:p>
             <a:fld id="{FD3A94D9-38B3-6A4F-AECD-4D297511D178}" type="datetimeFigureOut">
               <a:rPr lang="en-US" smtClean="0"/>
-              <a:t>3/12/21</a:t>
+              <a:t>11/26/21</a:t>
             </a:fld>
             <a:endParaRPr lang="en-US"/>
           </a:p>
@@ -1822,7 +1823,7 @@
           <a:p>
             <a:fld id="{FD3A94D9-38B3-6A4F-AECD-4D297511D178}" type="datetimeFigureOut">
               <a:rPr lang="en-US" smtClean="0"/>
-              <a:t>3/12/21</a:t>
+              <a:t>11/26/21</a:t>
             </a:fld>
             <a:endParaRPr lang="en-US"/>
           </a:p>
@@ -1963,7 +1964,7 @@
           <a:p>
             <a:fld id="{FD3A94D9-38B3-6A4F-AECD-4D297511D178}" type="datetimeFigureOut">
               <a:rPr lang="en-US" smtClean="0"/>
-              <a:t>3/12/21</a:t>
+              <a:t>11/26/21</a:t>
             </a:fld>
             <a:endParaRPr lang="en-US"/>
           </a:p>
@@ -2076,7 +2077,7 @@
           <a:p>
             <a:fld id="{FD3A94D9-38B3-6A4F-AECD-4D297511D178}" type="datetimeFigureOut">
               <a:rPr lang="en-US" smtClean="0"/>
-              <a:t>3/12/21</a:t>
+              <a:t>11/26/21</a:t>
             </a:fld>
             <a:endParaRPr lang="en-US"/>
           </a:p>
@@ -2387,7 +2388,7 @@
           <a:p>
             <a:fld id="{FD3A94D9-38B3-6A4F-AECD-4D297511D178}" type="datetimeFigureOut">
               <a:rPr lang="en-US" smtClean="0"/>
-              <a:t>3/12/21</a:t>
+              <a:t>11/26/21</a:t>
             </a:fld>
             <a:endParaRPr lang="en-US"/>
           </a:p>
@@ -2675,7 +2676,7 @@
           <a:p>
             <a:fld id="{FD3A94D9-38B3-6A4F-AECD-4D297511D178}" type="datetimeFigureOut">
               <a:rPr lang="en-US" smtClean="0"/>
-              <a:t>3/12/21</a:t>
+              <a:t>11/26/21</a:t>
             </a:fld>
             <a:endParaRPr lang="en-US"/>
           </a:p>
@@ -2916,7 +2917,7 @@
           <a:p>
             <a:fld id="{FD3A94D9-38B3-6A4F-AECD-4D297511D178}" type="datetimeFigureOut">
               <a:rPr lang="en-US" smtClean="0"/>
-              <a:t>3/12/21</a:t>
+              <a:t>11/26/21</a:t>
             </a:fld>
             <a:endParaRPr lang="en-US"/>
           </a:p>
@@ -5801,6 +5802,366 @@
           <a:p>
             <a:r>
               <a:rPr lang="en-US" dirty="0"/>
+              <a:t>Potentiometer Connections</a:t>
+            </a:r>
+          </a:p>
+        </p:txBody>
+      </p:sp>
+      <p:sp>
+        <p:nvSpPr>
+          <p:cNvPr id="22" name="Content Placeholder 21">
+            <a:extLst>
+              <a:ext uri="{FF2B5EF4-FFF2-40B4-BE49-F238E27FC236}">
+                <a16:creationId xmlns:a16="http://schemas.microsoft.com/office/drawing/2014/main" id="{15A44F54-44D6-5042-89A0-D89C669AC2AE}"/>
+              </a:ext>
+            </a:extLst>
+          </p:cNvPr>
+          <p:cNvSpPr>
+            <a:spLocks noGrp="1"/>
+          </p:cNvSpPr>
+          <p:nvPr>
+            <p:ph idx="1"/>
+          </p:nvPr>
+        </p:nvSpPr>
+        <p:spPr>
+          <a:xfrm>
+            <a:off x="838200" y="5199961"/>
+            <a:ext cx="10515600" cy="977002"/>
+          </a:xfrm>
+        </p:spPr>
+        <p:txBody>
+          <a:bodyPr/>
+          <a:lstStyle/>
+          <a:p>
+            <a:endParaRPr lang="en-US"/>
+          </a:p>
+        </p:txBody>
+      </p:sp>
+      <p:grpSp>
+        <p:nvGrpSpPr>
+          <p:cNvPr id="37" name="Group 36">
+            <a:extLst>
+              <a:ext uri="{FF2B5EF4-FFF2-40B4-BE49-F238E27FC236}">
+                <a16:creationId xmlns:a16="http://schemas.microsoft.com/office/drawing/2014/main" id="{6A001FF8-4D60-4541-93EB-48D3E47C1656}"/>
+              </a:ext>
+            </a:extLst>
+          </p:cNvPr>
+          <p:cNvGrpSpPr/>
+          <p:nvPr/>
+        </p:nvGrpSpPr>
+        <p:grpSpPr>
+          <a:xfrm>
+            <a:off x="403186" y="972590"/>
+            <a:ext cx="9692927" cy="3307510"/>
+            <a:chOff x="403186" y="972590"/>
+            <a:chExt cx="9692927" cy="3307510"/>
+          </a:xfrm>
+        </p:grpSpPr>
+        <p:pic>
+          <p:nvPicPr>
+            <p:cNvPr id="27" name="Picture 2" descr="How to Test Potentiometer(Find Bad Potentiometer) - Leets academy">
+              <a:extLst>
+                <a:ext uri="{FF2B5EF4-FFF2-40B4-BE49-F238E27FC236}">
+                  <a16:creationId xmlns:a16="http://schemas.microsoft.com/office/drawing/2014/main" id="{D3F49DCE-562B-C741-B5B6-B6FD4E6550D1}"/>
+                </a:ext>
+              </a:extLst>
+            </p:cNvPr>
+            <p:cNvPicPr>
+              <a:picLocks noChangeAspect="1" noChangeArrowheads="1"/>
+            </p:cNvPicPr>
+            <p:nvPr/>
+          </p:nvPicPr>
+          <p:blipFill rotWithShape="1">
+            <a:blip r:embed="rId2">
+              <a:extLst>
+                <a:ext uri="{28A0092B-C50C-407E-A947-70E740481C1C}">
+                  <a14:useLocalDpi xmlns:a14="http://schemas.microsoft.com/office/drawing/2010/main" val="0"/>
+                </a:ext>
+              </a:extLst>
+            </a:blip>
+            <a:srcRect l="23133" r="18145"/>
+            <a:stretch/>
+          </p:blipFill>
+          <p:spPr bwMode="auto">
+            <a:xfrm flipH="1">
+              <a:off x="6995708" y="1821072"/>
+              <a:ext cx="2159308" cy="2459028"/>
+            </a:xfrm>
+            <a:prstGeom prst="rect">
+              <a:avLst/>
+            </a:prstGeom>
+            <a:noFill/>
+            <a:extLst>
+              <a:ext uri="{909E8E84-426E-40DD-AFC4-6F175D3DCCD1}">
+                <a14:hiddenFill xmlns:a14="http://schemas.microsoft.com/office/drawing/2010/main">
+                  <a:solidFill>
+                    <a:srgbClr val="FFFFFF"/>
+                  </a:solidFill>
+                </a14:hiddenFill>
+              </a:ext>
+            </a:extLst>
+          </p:spPr>
+        </p:pic>
+        <p:pic>
+          <p:nvPicPr>
+            <p:cNvPr id="4" name="Picture 3">
+              <a:extLst>
+                <a:ext uri="{FF2B5EF4-FFF2-40B4-BE49-F238E27FC236}">
+                  <a16:creationId xmlns:a16="http://schemas.microsoft.com/office/drawing/2014/main" id="{2A74A638-6B9F-C243-A51A-63E49271E027}"/>
+                </a:ext>
+              </a:extLst>
+            </p:cNvPr>
+            <p:cNvPicPr>
+              <a:picLocks noChangeAspect="1"/>
+            </p:cNvPicPr>
+            <p:nvPr/>
+          </p:nvPicPr>
+          <p:blipFill rotWithShape="1">
+            <a:blip r:embed="rId3"/>
+            <a:srcRect b="2668"/>
+            <a:stretch/>
+          </p:blipFill>
+          <p:spPr>
+            <a:xfrm>
+              <a:off x="403186" y="972590"/>
+              <a:ext cx="5722958" cy="3030076"/>
+            </a:xfrm>
+            <a:prstGeom prst="rect">
+              <a:avLst/>
+            </a:prstGeom>
+          </p:spPr>
+        </p:pic>
+        <p:cxnSp>
+          <p:nvCxnSpPr>
+            <p:cNvPr id="5" name="Straight Arrow Connector 4">
+              <a:extLst>
+                <a:ext uri="{FF2B5EF4-FFF2-40B4-BE49-F238E27FC236}">
+                  <a16:creationId xmlns:a16="http://schemas.microsoft.com/office/drawing/2014/main" id="{F2672062-D70A-E043-9250-CE86E97EAD3C}"/>
+                </a:ext>
+              </a:extLst>
+            </p:cNvPr>
+            <p:cNvCxnSpPr>
+              <a:cxnSpLocks/>
+            </p:cNvCxnSpPr>
+            <p:nvPr/>
+          </p:nvCxnSpPr>
+          <p:spPr>
+            <a:xfrm flipH="1" flipV="1">
+              <a:off x="6037244" y="2798284"/>
+              <a:ext cx="1123720" cy="154236"/>
+            </a:xfrm>
+            <a:prstGeom prst="straightConnector1">
+              <a:avLst/>
+            </a:prstGeom>
+            <a:ln w="57150">
+              <a:solidFill>
+                <a:srgbClr val="FF0000"/>
+              </a:solidFill>
+              <a:tailEnd type="triangle"/>
+            </a:ln>
+          </p:spPr>
+          <p:style>
+            <a:lnRef idx="1">
+              <a:schemeClr val="accent1"/>
+            </a:lnRef>
+            <a:fillRef idx="0">
+              <a:schemeClr val="accent1"/>
+            </a:fillRef>
+            <a:effectRef idx="0">
+              <a:schemeClr val="accent1"/>
+            </a:effectRef>
+            <a:fontRef idx="minor">
+              <a:schemeClr val="tx1"/>
+            </a:fontRef>
+          </p:style>
+        </p:cxnSp>
+        <p:cxnSp>
+          <p:nvCxnSpPr>
+            <p:cNvPr id="6" name="Straight Arrow Connector 5">
+              <a:extLst>
+                <a:ext uri="{FF2B5EF4-FFF2-40B4-BE49-F238E27FC236}">
+                  <a16:creationId xmlns:a16="http://schemas.microsoft.com/office/drawing/2014/main" id="{60DAED21-D6A4-6D4A-B0B2-3BD0A6AC1DDD}"/>
+                </a:ext>
+              </a:extLst>
+            </p:cNvPr>
+            <p:cNvCxnSpPr>
+              <a:cxnSpLocks/>
+            </p:cNvCxnSpPr>
+            <p:nvPr/>
+          </p:nvCxnSpPr>
+          <p:spPr>
+            <a:xfrm flipH="1" flipV="1">
+              <a:off x="6056260" y="3320754"/>
+              <a:ext cx="1038603" cy="292779"/>
+            </a:xfrm>
+            <a:prstGeom prst="straightConnector1">
+              <a:avLst/>
+            </a:prstGeom>
+            <a:ln w="57150">
+              <a:solidFill>
+                <a:schemeClr val="tx1"/>
+              </a:solidFill>
+              <a:tailEnd type="triangle"/>
+            </a:ln>
+          </p:spPr>
+          <p:style>
+            <a:lnRef idx="1">
+              <a:schemeClr val="accent1"/>
+            </a:lnRef>
+            <a:fillRef idx="0">
+              <a:schemeClr val="accent1"/>
+            </a:fillRef>
+            <a:effectRef idx="0">
+              <a:schemeClr val="accent1"/>
+            </a:effectRef>
+            <a:fontRef idx="minor">
+              <a:schemeClr val="tx1"/>
+            </a:fontRef>
+          </p:style>
+        </p:cxnSp>
+        <p:cxnSp>
+          <p:nvCxnSpPr>
+            <p:cNvPr id="25" name="Straight Arrow Connector 24">
+              <a:extLst>
+                <a:ext uri="{FF2B5EF4-FFF2-40B4-BE49-F238E27FC236}">
+                  <a16:creationId xmlns:a16="http://schemas.microsoft.com/office/drawing/2014/main" id="{4028019E-1102-C64D-ABA7-FA7D147CE441}"/>
+                </a:ext>
+              </a:extLst>
+            </p:cNvPr>
+            <p:cNvCxnSpPr>
+              <a:cxnSpLocks/>
+            </p:cNvCxnSpPr>
+            <p:nvPr/>
+          </p:nvCxnSpPr>
+          <p:spPr>
+            <a:xfrm flipH="1">
+              <a:off x="6059278" y="3249976"/>
+              <a:ext cx="1068635" cy="649995"/>
+            </a:xfrm>
+            <a:prstGeom prst="straightConnector1">
+              <a:avLst/>
+            </a:prstGeom>
+            <a:ln w="57150">
+              <a:solidFill>
+                <a:schemeClr val="accent4">
+                  <a:lumMod val="60000"/>
+                  <a:lumOff val="40000"/>
+                </a:schemeClr>
+              </a:solidFill>
+              <a:tailEnd type="triangle"/>
+            </a:ln>
+          </p:spPr>
+          <p:style>
+            <a:lnRef idx="1">
+              <a:schemeClr val="accent1"/>
+            </a:lnRef>
+            <a:fillRef idx="0">
+              <a:schemeClr val="accent1"/>
+            </a:fillRef>
+            <a:effectRef idx="0">
+              <a:schemeClr val="accent1"/>
+            </a:effectRef>
+            <a:fontRef idx="minor">
+              <a:schemeClr val="tx1"/>
+            </a:fontRef>
+          </p:style>
+        </p:cxnSp>
+        <p:sp>
+          <p:nvSpPr>
+            <p:cNvPr id="36" name="TextBox 35">
+              <a:extLst>
+                <a:ext uri="{FF2B5EF4-FFF2-40B4-BE49-F238E27FC236}">
+                  <a16:creationId xmlns:a16="http://schemas.microsoft.com/office/drawing/2014/main" id="{91F30296-A64A-7C41-ADD2-39C51DD88E38}"/>
+                </a:ext>
+              </a:extLst>
+            </p:cNvPr>
+            <p:cNvSpPr txBox="1"/>
+            <p:nvPr/>
+          </p:nvSpPr>
+          <p:spPr>
+            <a:xfrm>
+              <a:off x="6995712" y="1344059"/>
+              <a:ext cx="3100401" cy="369332"/>
+            </a:xfrm>
+            <a:prstGeom prst="rect">
+              <a:avLst/>
+            </a:prstGeom>
+            <a:noFill/>
+          </p:spPr>
+          <p:txBody>
+            <a:bodyPr wrap="none" rtlCol="0">
+              <a:spAutoFit/>
+            </a:bodyPr>
+            <a:lstStyle/>
+            <a:p>
+              <a:r>
+                <a:rPr lang="en-US" dirty="0"/>
+                <a:t>10K Ohm Linear Potentiometer</a:t>
+              </a:r>
+            </a:p>
+          </p:txBody>
+        </p:sp>
+      </p:grpSp>
+    </p:spTree>
+    <p:extLst>
+      <p:ext uri="{BB962C8B-B14F-4D97-AF65-F5344CB8AC3E}">
+        <p14:creationId xmlns:p14="http://schemas.microsoft.com/office/powerpoint/2010/main" val="1664901890"/>
+      </p:ext>
+    </p:extLst>
+  </p:cSld>
+  <p:clrMapOvr>
+    <a:masterClrMapping/>
+  </p:clrMapOvr>
+</p:sld>
+</file>
+
+<file path=ppt/slides/slide9.xml><?xml version="1.0" encoding="utf-8"?>
+<p:sld xmlns:a="http://schemas.openxmlformats.org/drawingml/2006/main" xmlns:r="http://schemas.openxmlformats.org/officeDocument/2006/relationships" xmlns:p="http://schemas.openxmlformats.org/presentationml/2006/main">
+  <p:cSld>
+    <p:spTree>
+      <p:nvGrpSpPr>
+        <p:cNvPr id="1" name=""/>
+        <p:cNvGrpSpPr/>
+        <p:nvPr/>
+      </p:nvGrpSpPr>
+      <p:grpSpPr>
+        <a:xfrm>
+          <a:off x="0" y="0"/>
+          <a:ext cx="0" cy="0"/>
+          <a:chOff x="0" y="0"/>
+          <a:chExt cx="0" cy="0"/>
+        </a:xfrm>
+      </p:grpSpPr>
+      <p:sp>
+        <p:nvSpPr>
+          <p:cNvPr id="2" name="Title 1">
+            <a:extLst>
+              <a:ext uri="{FF2B5EF4-FFF2-40B4-BE49-F238E27FC236}">
+                <a16:creationId xmlns:a16="http://schemas.microsoft.com/office/drawing/2014/main" id="{210A1B92-FE32-A64F-9EE0-003856F2DE06}"/>
+              </a:ext>
+            </a:extLst>
+          </p:cNvPr>
+          <p:cNvSpPr>
+            <a:spLocks noGrp="1"/>
+          </p:cNvSpPr>
+          <p:nvPr>
+            <p:ph type="title"/>
+          </p:nvPr>
+        </p:nvSpPr>
+        <p:spPr>
+          <a:xfrm>
+            <a:off x="243289" y="200911"/>
+            <a:ext cx="10515600" cy="451428"/>
+          </a:xfrm>
+        </p:spPr>
+        <p:txBody>
+          <a:bodyPr>
+            <a:normAutofit fontScale="90000"/>
+          </a:bodyPr>
+          <a:lstStyle/>
+          <a:p>
+            <a:r>
+              <a:rPr lang="en-US" dirty="0"/>
               <a:t>SSH1306 SPI Connections</a:t>
             </a:r>
           </a:p>
@@ -6694,7 +7055,7 @@
     </p:spTree>
     <p:extLst>
       <p:ext uri="{BB962C8B-B14F-4D97-AF65-F5344CB8AC3E}">
-        <p14:creationId xmlns:p14="http://schemas.microsoft.com/office/powerpoint/2010/main" val="1664901890"/>
+        <p14:creationId xmlns:p14="http://schemas.microsoft.com/office/powerpoint/2010/main" val="1816727872"/>
       </p:ext>
     </p:extLst>
   </p:cSld>

</xml_diff>